<commit_message>
QA: added new homework for week 3
</commit_message>
<xml_diff>
--- a/Presentations/QA Automation Course Week 3.pptx
+++ b/Presentations/QA Automation Course Week 3.pptx
@@ -20,7 +20,8 @@
     <p:sldId id="271" r:id="rId14"/>
     <p:sldId id="270" r:id="rId15"/>
     <p:sldId id="272" r:id="rId16"/>
-    <p:sldId id="260" r:id="rId17"/>
+    <p:sldId id="275" r:id="rId17"/>
+    <p:sldId id="260" r:id="rId18"/>
   </p:sldIdLst>
   <p:sldSz cx="12192000" cy="6858000"/>
   <p:notesSz cx="6858000" cy="9144000"/>
@@ -258,7 +259,7 @@
           <a:p>
             <a:fld id="{CD8154C3-BB2F-4D85-B412-A0EFA0706C73}" type="datetimeFigureOut">
               <a:rPr lang="bg-BG" smtClean="0"/>
-              <a:t>24.4.2017 г.</a:t>
+              <a:t>3.5.2017 г.</a:t>
             </a:fld>
             <a:endParaRPr lang="bg-BG"/>
           </a:p>
@@ -428,7 +429,7 @@
           <a:p>
             <a:fld id="{CD8154C3-BB2F-4D85-B412-A0EFA0706C73}" type="datetimeFigureOut">
               <a:rPr lang="bg-BG" smtClean="0"/>
-              <a:t>24.4.2017 г.</a:t>
+              <a:t>3.5.2017 г.</a:t>
             </a:fld>
             <a:endParaRPr lang="bg-BG"/>
           </a:p>
@@ -608,7 +609,7 @@
           <a:p>
             <a:fld id="{CD8154C3-BB2F-4D85-B412-A0EFA0706C73}" type="datetimeFigureOut">
               <a:rPr lang="bg-BG" smtClean="0"/>
-              <a:t>24.4.2017 г.</a:t>
+              <a:t>3.5.2017 г.</a:t>
             </a:fld>
             <a:endParaRPr lang="bg-BG"/>
           </a:p>
@@ -778,7 +779,7 @@
           <a:p>
             <a:fld id="{CD8154C3-BB2F-4D85-B412-A0EFA0706C73}" type="datetimeFigureOut">
               <a:rPr lang="bg-BG" smtClean="0"/>
-              <a:t>24.4.2017 г.</a:t>
+              <a:t>3.5.2017 г.</a:t>
             </a:fld>
             <a:endParaRPr lang="bg-BG"/>
           </a:p>
@@ -1024,7 +1025,7 @@
           <a:p>
             <a:fld id="{CD8154C3-BB2F-4D85-B412-A0EFA0706C73}" type="datetimeFigureOut">
               <a:rPr lang="bg-BG" smtClean="0"/>
-              <a:t>24.4.2017 г.</a:t>
+              <a:t>3.5.2017 г.</a:t>
             </a:fld>
             <a:endParaRPr lang="bg-BG"/>
           </a:p>
@@ -1256,7 +1257,7 @@
           <a:p>
             <a:fld id="{CD8154C3-BB2F-4D85-B412-A0EFA0706C73}" type="datetimeFigureOut">
               <a:rPr lang="bg-BG" smtClean="0"/>
-              <a:t>24.4.2017 г.</a:t>
+              <a:t>3.5.2017 г.</a:t>
             </a:fld>
             <a:endParaRPr lang="bg-BG"/>
           </a:p>
@@ -1623,7 +1624,7 @@
           <a:p>
             <a:fld id="{CD8154C3-BB2F-4D85-B412-A0EFA0706C73}" type="datetimeFigureOut">
               <a:rPr lang="bg-BG" smtClean="0"/>
-              <a:t>24.4.2017 г.</a:t>
+              <a:t>3.5.2017 г.</a:t>
             </a:fld>
             <a:endParaRPr lang="bg-BG"/>
           </a:p>
@@ -1741,7 +1742,7 @@
           <a:p>
             <a:fld id="{CD8154C3-BB2F-4D85-B412-A0EFA0706C73}" type="datetimeFigureOut">
               <a:rPr lang="bg-BG" smtClean="0"/>
-              <a:t>24.4.2017 г.</a:t>
+              <a:t>3.5.2017 г.</a:t>
             </a:fld>
             <a:endParaRPr lang="bg-BG"/>
           </a:p>
@@ -1836,7 +1837,7 @@
           <a:p>
             <a:fld id="{CD8154C3-BB2F-4D85-B412-A0EFA0706C73}" type="datetimeFigureOut">
               <a:rPr lang="bg-BG" smtClean="0"/>
-              <a:t>24.4.2017 г.</a:t>
+              <a:t>3.5.2017 г.</a:t>
             </a:fld>
             <a:endParaRPr lang="bg-BG"/>
           </a:p>
@@ -2113,7 +2114,7 @@
           <a:p>
             <a:fld id="{CD8154C3-BB2F-4D85-B412-A0EFA0706C73}" type="datetimeFigureOut">
               <a:rPr lang="bg-BG" smtClean="0"/>
-              <a:t>24.4.2017 г.</a:t>
+              <a:t>3.5.2017 г.</a:t>
             </a:fld>
             <a:endParaRPr lang="bg-BG"/>
           </a:p>
@@ -2366,7 +2367,7 @@
           <a:p>
             <a:fld id="{CD8154C3-BB2F-4D85-B412-A0EFA0706C73}" type="datetimeFigureOut">
               <a:rPr lang="bg-BG" smtClean="0"/>
-              <a:t>24.4.2017 г.</a:t>
+              <a:t>3.5.2017 г.</a:t>
             </a:fld>
             <a:endParaRPr lang="bg-BG"/>
           </a:p>
@@ -2579,7 +2580,7 @@
           <a:p>
             <a:fld id="{CD8154C3-BB2F-4D85-B412-A0EFA0706C73}" type="datetimeFigureOut">
               <a:rPr lang="bg-BG" smtClean="0"/>
-              <a:t>24.4.2017 г.</a:t>
+              <a:t>3.5.2017 г.</a:t>
             </a:fld>
             <a:endParaRPr lang="bg-BG"/>
           </a:p>
@@ -3135,11 +3136,7 @@
             </a:r>
             <a:r>
               <a:rPr lang="en-US" dirty="0" smtClean="0"/>
-              <a:t> </a:t>
-            </a:r>
-            <a:r>
-              <a:rPr lang="en-US" dirty="0" smtClean="0"/>
-              <a:t>examples</a:t>
+              <a:t> examples</a:t>
             </a:r>
           </a:p>
           <a:p>
@@ -4046,7 +4043,6 @@
               <a:rPr lang="en-US" dirty="0" smtClean="0"/>
               <a:t> 67890</a:t>
             </a:r>
-            <a:endParaRPr lang="en-US" dirty="0" smtClean="0"/>
           </a:p>
           <a:p>
             <a:r>
@@ -4057,7 +4053,6 @@
               <a:rPr lang="en-US" dirty="0" smtClean="0"/>
               <a:t> - ?????</a:t>
             </a:r>
-            <a:endParaRPr lang="en-US" dirty="0" smtClean="0"/>
           </a:p>
           <a:p>
             <a:r>
@@ -4068,21 +4063,18 @@
               <a:rPr lang="en-US" dirty="0" smtClean="0"/>
               <a:t> 74352</a:t>
             </a:r>
-            <a:endParaRPr lang="en-US" dirty="0" smtClean="0"/>
           </a:p>
           <a:p>
             <a:r>
               <a:rPr lang="en-US" dirty="0" smtClean="0"/>
               <a:t>Eva 10125</a:t>
             </a:r>
-            <a:endParaRPr lang="en-US" dirty="0" smtClean="0"/>
           </a:p>
           <a:p>
             <a:r>
               <a:rPr lang="en-US" dirty="0" smtClean="0"/>
               <a:t>Dido 84111</a:t>
             </a:r>
-            <a:endParaRPr lang="en-US" dirty="0" smtClean="0"/>
           </a:p>
           <a:p>
             <a:r>
@@ -4093,7 +4085,6 @@
               <a:rPr lang="en-US" dirty="0" smtClean="0"/>
               <a:t> 66666</a:t>
             </a:r>
-            <a:endParaRPr lang="en-US" dirty="0" smtClean="0"/>
           </a:p>
           <a:p>
             <a:r>
@@ -4204,11 +4195,7 @@
           <a:p>
             <a:r>
               <a:rPr lang="en-US" sz="2000" dirty="0" smtClean="0"/>
-              <a:t>Digit </a:t>
-            </a:r>
-            <a:r>
-              <a:rPr lang="en-US" sz="2000" dirty="0" smtClean="0"/>
-              <a:t>1: </a:t>
+              <a:t>Digit 1: </a:t>
             </a:r>
             <a:r>
               <a:rPr lang="bg-BG" sz="2000" dirty="0" smtClean="0"/>
@@ -4326,15 +4313,7 @@
             </a:r>
             <a:r>
               <a:rPr lang="en-US" sz="1600" dirty="0" smtClean="0"/>
-              <a:t>” button for the </a:t>
-            </a:r>
-            <a:r>
-              <a:rPr lang="en-US" sz="1600" dirty="0" smtClean="0"/>
-              <a:t>(preferably) second </a:t>
-            </a:r>
-            <a:r>
-              <a:rPr lang="en-US" sz="1600" dirty="0" smtClean="0"/>
-              <a:t>property in the list</a:t>
+              <a:t>” button for the (preferably) second property in the list</a:t>
             </a:r>
           </a:p>
           <a:p>
@@ -4396,6 +4375,296 @@
             <p:ph type="title"/>
           </p:nvPr>
         </p:nvSpPr>
+        <p:spPr/>
+        <p:txBody>
+          <a:bodyPr/>
+          <a:lstStyle/>
+          <a:p>
+            <a:r>
+              <a:rPr lang="en-US" dirty="0" smtClean="0"/>
+              <a:t>Homework 2</a:t>
+            </a:r>
+            <a:endParaRPr lang="en-US" dirty="0"/>
+          </a:p>
+        </p:txBody>
+      </p:sp>
+      <p:sp>
+        <p:nvSpPr>
+          <p:cNvPr id="7" name="Content Placeholder 6"/>
+          <p:cNvSpPr>
+            <a:spLocks noGrp="1"/>
+          </p:cNvSpPr>
+          <p:nvPr>
+            <p:ph idx="1"/>
+          </p:nvPr>
+        </p:nvSpPr>
+        <p:spPr>
+          <a:xfrm>
+            <a:off x="838200" y="1354975"/>
+            <a:ext cx="5886796" cy="5353396"/>
+          </a:xfrm>
+        </p:spPr>
+        <p:txBody>
+          <a:bodyPr>
+            <a:normAutofit fontScale="92500" lnSpcReduction="10000"/>
+          </a:bodyPr>
+          <a:lstStyle/>
+          <a:p>
+            <a:pPr lvl="0"/>
+            <a:r>
+              <a:rPr lang="en-US" sz="2400" dirty="0"/>
+              <a:t>Open </a:t>
+            </a:r>
+            <a:r>
+              <a:rPr lang="en-US" sz="2400" u="sng" dirty="0">
+                <a:hlinkClick r:id="rId2"/>
+              </a:rPr>
+              <a:t>https://yavlenawebsite.melontech.com/service/</a:t>
+            </a:r>
+            <a:endParaRPr lang="en-US" sz="2400" dirty="0"/>
+          </a:p>
+          <a:p>
+            <a:pPr lvl="0"/>
+            <a:r>
+              <a:rPr lang="en-US" sz="2400" dirty="0"/>
+              <a:t>On the left there are links to different services</a:t>
+            </a:r>
+          </a:p>
+          <a:p>
+            <a:r>
+              <a:rPr lang="en-US" sz="2400" dirty="0"/>
+              <a:t>Everyone should click on a different service:</a:t>
+            </a:r>
+          </a:p>
+          <a:p>
+            <a:pPr lvl="1"/>
+            <a:r>
+              <a:rPr lang="en-US" dirty="0"/>
+              <a:t>Tsanka </a:t>
+            </a:r>
+            <a:r>
+              <a:rPr lang="bg-BG" dirty="0"/>
+              <a:t>Продажба</a:t>
+            </a:r>
+            <a:endParaRPr lang="en-US" dirty="0"/>
+          </a:p>
+          <a:p>
+            <a:pPr lvl="1"/>
+            <a:r>
+              <a:rPr lang="en-US" dirty="0" err="1"/>
+              <a:t>Aleks</a:t>
+            </a:r>
+            <a:r>
+              <a:rPr lang="en-US" dirty="0"/>
+              <a:t> - </a:t>
+            </a:r>
+            <a:r>
+              <a:rPr lang="bg-BG" dirty="0"/>
+              <a:t>Покупка</a:t>
+            </a:r>
+            <a:endParaRPr lang="en-US" dirty="0"/>
+          </a:p>
+          <a:p>
+            <a:pPr lvl="1"/>
+            <a:r>
+              <a:rPr lang="en-US" dirty="0" err="1"/>
+              <a:t>Mitko</a:t>
+            </a:r>
+            <a:r>
+              <a:rPr lang="en-US" dirty="0"/>
+              <a:t> </a:t>
+            </a:r>
+            <a:r>
+              <a:rPr lang="bg-BG" dirty="0"/>
+              <a:t>Наем</a:t>
+            </a:r>
+            <a:endParaRPr lang="en-US" dirty="0"/>
+          </a:p>
+          <a:p>
+            <a:pPr lvl="1"/>
+            <a:r>
+              <a:rPr lang="en-US" dirty="0"/>
+              <a:t>Eva </a:t>
+            </a:r>
+            <a:r>
+              <a:rPr lang="bg-BG" dirty="0"/>
+              <a:t>Отдаване под наем</a:t>
+            </a:r>
+            <a:endParaRPr lang="en-US" dirty="0"/>
+          </a:p>
+          <a:p>
+            <a:pPr lvl="1"/>
+            <a:r>
+              <a:rPr lang="en-US" dirty="0"/>
+              <a:t>Dido </a:t>
+            </a:r>
+            <a:r>
+              <a:rPr lang="bg-BG" dirty="0"/>
+              <a:t>Оценки</a:t>
+            </a:r>
+            <a:endParaRPr lang="en-US" dirty="0"/>
+          </a:p>
+          <a:p>
+            <a:pPr lvl="1"/>
+            <a:r>
+              <a:rPr lang="en-US" dirty="0" err="1"/>
+              <a:t>Pesho</a:t>
+            </a:r>
+            <a:r>
+              <a:rPr lang="en-US" dirty="0"/>
+              <a:t> </a:t>
+            </a:r>
+            <a:r>
+              <a:rPr lang="bg-BG" dirty="0"/>
+              <a:t>Пазарни проучвания</a:t>
+            </a:r>
+            <a:endParaRPr lang="en-US" dirty="0"/>
+          </a:p>
+          <a:p>
+            <a:pPr lvl="1"/>
+            <a:r>
+              <a:rPr lang="en-US" dirty="0"/>
+              <a:t>Stefan </a:t>
+            </a:r>
+            <a:r>
+              <a:rPr lang="bg-BG" dirty="0"/>
+              <a:t>Съдействие при сделка</a:t>
+            </a:r>
+            <a:endParaRPr lang="en-US" dirty="0"/>
+          </a:p>
+          <a:p>
+            <a:pPr lvl="0"/>
+            <a:r>
+              <a:rPr lang="en-US" sz="2400" dirty="0"/>
+              <a:t>After clicking on the link for the service new webpage is opened. On the newly opened page make sure </a:t>
+            </a:r>
+            <a:r>
+              <a:rPr lang="en-US" sz="2400" b="1" dirty="0"/>
+              <a:t>the correct checkbox is ticked</a:t>
+            </a:r>
+            <a:r>
+              <a:rPr lang="en-US" sz="2400" dirty="0"/>
+              <a:t>: next to the service you chose in the previous screen</a:t>
+            </a:r>
+          </a:p>
+          <a:p>
+            <a:endParaRPr lang="en-US" dirty="0"/>
+          </a:p>
+        </p:txBody>
+      </p:sp>
+      <p:pic>
+        <p:nvPicPr>
+          <p:cNvPr id="10" name="Picture 9"/>
+          <p:cNvPicPr/>
+          <p:nvPr/>
+        </p:nvPicPr>
+        <p:blipFill>
+          <a:blip r:embed="rId3">
+            <a:extLst>
+              <a:ext uri="{28A0092B-C50C-407E-A947-70E740481C1C}">
+                <a14:useLocalDpi xmlns:a14="http://schemas.microsoft.com/office/drawing/2010/main" val="0"/>
+              </a:ext>
+            </a:extLst>
+          </a:blip>
+          <a:srcRect/>
+          <a:stretch>
+            <a:fillRect/>
+          </a:stretch>
+        </p:blipFill>
+        <p:spPr bwMode="auto">
+          <a:xfrm>
+            <a:off x="7915245" y="294582"/>
+            <a:ext cx="3028315" cy="3143250"/>
+          </a:xfrm>
+          <a:prstGeom prst="rect">
+            <a:avLst/>
+          </a:prstGeom>
+          <a:noFill/>
+          <a:ln>
+            <a:noFill/>
+          </a:ln>
+        </p:spPr>
+      </p:pic>
+      <p:pic>
+        <p:nvPicPr>
+          <p:cNvPr id="11" name="Picture 10"/>
+          <p:cNvPicPr/>
+          <p:nvPr/>
+        </p:nvPicPr>
+        <p:blipFill>
+          <a:blip r:embed="rId4">
+            <a:extLst>
+              <a:ext uri="{28A0092B-C50C-407E-A947-70E740481C1C}">
+                <a14:useLocalDpi xmlns:a14="http://schemas.microsoft.com/office/drawing/2010/main" val="0"/>
+              </a:ext>
+            </a:extLst>
+          </a:blip>
+          <a:srcRect/>
+          <a:stretch>
+            <a:fillRect/>
+          </a:stretch>
+        </p:blipFill>
+        <p:spPr bwMode="auto">
+          <a:xfrm>
+            <a:off x="7040880" y="3042459"/>
+            <a:ext cx="5726343" cy="5111230"/>
+          </a:xfrm>
+          <a:prstGeom prst="rect">
+            <a:avLst/>
+          </a:prstGeom>
+          <a:noFill/>
+          <a:ln>
+            <a:noFill/>
+          </a:ln>
+        </p:spPr>
+      </p:pic>
+    </p:spTree>
+    <p:extLst>
+      <p:ext uri="{BB962C8B-B14F-4D97-AF65-F5344CB8AC3E}">
+        <p14:creationId xmlns:p14="http://schemas.microsoft.com/office/powerpoint/2010/main" val="1548044797"/>
+      </p:ext>
+    </p:extLst>
+  </p:cSld>
+  <p:clrMapOvr>
+    <a:masterClrMapping/>
+  </p:clrMapOvr>
+  <p:timing>
+    <p:tnLst>
+      <p:par>
+        <p:cTn id="1" dur="indefinite" restart="never" nodeType="tmRoot"/>
+      </p:par>
+    </p:tnLst>
+  </p:timing>
+</p:sld>
+</file>
+
+<file path=ppt/slides/slide17.xml><?xml version="1.0" encoding="utf-8"?>
+<p:sld xmlns:a="http://schemas.openxmlformats.org/drawingml/2006/main" xmlns:r="http://schemas.openxmlformats.org/officeDocument/2006/relationships" xmlns:p="http://schemas.openxmlformats.org/presentationml/2006/main">
+  <p:cSld>
+    <p:spTree>
+      <p:nvGrpSpPr>
+        <p:cNvPr id="1" name=""/>
+        <p:cNvGrpSpPr/>
+        <p:nvPr/>
+      </p:nvGrpSpPr>
+      <p:grpSpPr>
+        <a:xfrm>
+          <a:off x="0" y="0"/>
+          <a:ext cx="0" cy="0"/>
+          <a:chOff x="0" y="0"/>
+          <a:chExt cx="0" cy="0"/>
+        </a:xfrm>
+      </p:grpSpPr>
+      <p:sp>
+        <p:nvSpPr>
+          <p:cNvPr id="2" name="Title 1"/>
+          <p:cNvSpPr>
+            <a:spLocks noGrp="1"/>
+          </p:cNvSpPr>
+          <p:nvPr>
+            <p:ph type="title"/>
+          </p:nvPr>
+        </p:nvSpPr>
         <p:spPr>
           <a:xfrm>
             <a:off x="1028700" y="2765425"/>
@@ -4425,6 +4694,13 @@
   <p:clrMapOvr>
     <a:masterClrMapping/>
   </p:clrMapOvr>
+  <p:timing>
+    <p:tnLst>
+      <p:par>
+        <p:cTn id="1" dur="indefinite" restart="never" nodeType="tmRoot"/>
+      </p:par>
+    </p:tnLst>
+  </p:timing>
 </p:sld>
 </file>
 

</xml_diff>